<commit_message>
REPORTGEN-299 : add technologies use case
</commit_message>
<xml_diff>
--- a/CastReporting.Reporting/PortfolioTemplatesFiles/Portfolio Generic Table Definition.pptx
+++ b/CastReporting.Reporting/PortfolioTemplatesFiles/Portfolio Generic Table Definition.pptx
@@ -19713,7 +19713,7 @@
           <a:p>
             <a:r>
               <a:rPr lang="en-US" sz="1400" dirty="0"/>
-              <a:t>TABLE;PF_GENERIC_TABLE;COL1=METRICS,ROW1=TECHNOLOGIES,METRICS=HEALTH_FACTORS,TECHNOLOGIES=EACH</a:t>
+              <a:t>TABLE;PF_GENERIC_TABLE;COL1=METRICS,ROW1=TECHNOLOGIES,METRICS=HEALTH_FACTOR,TECHNOLOGIES=EACH</a:t>
             </a:r>
           </a:p>
           <a:p>
@@ -19759,14 +19759,14 @@
       </p:pic>
       <p:graphicFrame>
         <p:nvGraphicFramePr>
-          <p:cNvPr id="8" name="Table 7" descr="TABLE;PF_GENERIC_TABLE;COL1=METRICS,ROW1=TECHNOLOGIES,METRICS=HEALTH_FACTORS,TECHNOLOGIES=EACH"/>
+          <p:cNvPr id="8" name="Table 7" descr="TABLE;PF_GENERIC_TABLE;COL1=METRICS,ROW1=TECHNOLOGIES,METRICS=HEALTH_FACTOR,TECHNOLOGIES=EACH"/>
           <p:cNvGraphicFramePr>
             <a:graphicFrameLocks noGrp="1"/>
           </p:cNvGraphicFramePr>
           <p:nvPr>
             <p:extLst>
               <p:ext uri="{D42A27DB-BD31-4B8C-83A1-F6EECF244321}">
-                <p14:modId xmlns:p14="http://schemas.microsoft.com/office/powerpoint/2010/main" val="2641682544"/>
+                <p14:modId xmlns:p14="http://schemas.microsoft.com/office/powerpoint/2010/main" val="3693903616"/>
               </p:ext>
             </p:extLst>
           </p:nvPr>

</xml_diff>

<commit_message>
Fix error in description
</commit_message>
<xml_diff>
--- a/CastReporting.Reporting/PortfolioTemplatesFiles/Portfolio Generic Table Definition.pptx
+++ b/CastReporting.Reporting/PortfolioTemplatesFiles/Portfolio Generic Table Definition.pptx
@@ -135,10 +135,6 @@
 </p:presentation>
 </file>
 
-<file path=ppt/revisionInfo.xml><?xml version="1.0" encoding="utf-8"?>
-<p1510:revInfo xmlns:a="http://schemas.openxmlformats.org/drawingml/2006/main" xmlns:r="http://schemas.openxmlformats.org/officeDocument/2006/relationships" xmlns:p1510="http://schemas.microsoft.com/office/powerpoint/2015/10/main"/>
-</file>
-
 <file path=ppt/notesMasters/notesMaster1.xml><?xml version="1.0" encoding="utf-8"?>
 <p:notesMaster xmlns:a="http://schemas.openxmlformats.org/drawingml/2006/main" xmlns:r="http://schemas.openxmlformats.org/officeDocument/2006/relationships" xmlns:p="http://schemas.openxmlformats.org/presentationml/2006/main">
   <p:cSld>
@@ -221,7 +217,7 @@
           <a:p>
             <a:fld id="{BE7CF963-E58D-FC4D-BA9E-60A980752DC6}" type="datetimeFigureOut">
               <a:rPr lang="en-US" smtClean="0"/>
-              <a:t>9/12/2017</a:t>
+              <a:t>12/21/2018</a:t>
             </a:fld>
             <a:endParaRPr lang="en-US"/>
           </a:p>
@@ -794,7 +790,7 @@
           <a:p>
             <a:fld id="{B590C078-9131-4E49-8A0D-400FEE8377B5}" type="datetimeFigureOut">
               <a:rPr lang="en-US" smtClean="0"/>
-              <a:t>9/12/2017</a:t>
+              <a:t>12/21/2018</a:t>
             </a:fld>
             <a:endParaRPr lang="en-US"/>
           </a:p>
@@ -4379,7 +4375,7 @@
           <a:p>
             <a:fld id="{B590C078-9131-4E49-8A0D-400FEE8377B5}" type="datetimeFigureOut">
               <a:rPr lang="en-US" smtClean="0"/>
-              <a:t>9/12/2017</a:t>
+              <a:t>12/21/2018</a:t>
             </a:fld>
             <a:endParaRPr lang="en-US"/>
           </a:p>
@@ -8457,7 +8453,7 @@
           <a:p>
             <a:fld id="{B590C078-9131-4E49-8A0D-400FEE8377B5}" type="datetimeFigureOut">
               <a:rPr lang="en-US" smtClean="0"/>
-              <a:t>9/12/2017</a:t>
+              <a:t>12/21/2018</a:t>
             </a:fld>
             <a:endParaRPr lang="en-US"/>
           </a:p>
@@ -12282,7 +12278,7 @@
           <a:p>
             <a:fld id="{B590C078-9131-4E49-8A0D-400FEE8377B5}" type="datetimeFigureOut">
               <a:rPr lang="en-US" smtClean="0"/>
-              <a:t>9/12/2017</a:t>
+              <a:t>12/21/2018</a:t>
             </a:fld>
             <a:endParaRPr lang="en-US"/>
           </a:p>
@@ -14277,7 +14273,11 @@
             </a:r>
             <a:r>
               <a:rPr lang="en-GB" dirty="0"/>
-              <a:t>: if no information filled, then default value is “EACH"</a:t>
+              <a:t>: if no information filled, then default value </a:t>
+            </a:r>
+            <a:r>
+              <a:rPr lang="en-GB"/>
+              <a:t>is “ALL"</a:t>
             </a:r>
             <a:endParaRPr lang="en-US" dirty="0"/>
           </a:p>

</xml_diff>

<commit_message>
REPORTGEN-348: custom expression for portfolio generic content
</commit_message>
<xml_diff>
--- a/CastReporting.Reporting/PortfolioTemplatesFiles/Portfolio Generic Table Definition.pptx
+++ b/CastReporting.Reporting/PortfolioTemplatesFiles/Portfolio Generic Table Definition.pptx
@@ -5,7 +5,7 @@
     <p:sldMasterId id="2147483648" r:id="rId1"/>
   </p:sldMasterIdLst>
   <p:notesMasterIdLst>
-    <p:notesMasterId r:id="rId12"/>
+    <p:notesMasterId r:id="rId13"/>
   </p:notesMasterIdLst>
   <p:sldIdLst>
     <p:sldId id="387" r:id="rId2"/>
@@ -17,7 +17,8 @@
     <p:sldId id="385" r:id="rId8"/>
     <p:sldId id="388" r:id="rId9"/>
     <p:sldId id="389" r:id="rId10"/>
-    <p:sldId id="386" r:id="rId11"/>
+    <p:sldId id="390" r:id="rId11"/>
+    <p:sldId id="386" r:id="rId12"/>
   </p:sldIdLst>
   <p:sldSz cx="12192000" cy="6858000"/>
   <p:notesSz cx="6858000" cy="9144000"/>
@@ -217,7 +218,7 @@
           <a:p>
             <a:fld id="{BE7CF963-E58D-FC4D-BA9E-60A980752DC6}" type="datetimeFigureOut">
               <a:rPr lang="en-US" smtClean="0"/>
-              <a:t>12/21/2018</a:t>
+              <a:t>9/19/2019</a:t>
             </a:fld>
             <a:endParaRPr lang="en-US"/>
           </a:p>
@@ -790,7 +791,7 @@
           <a:p>
             <a:fld id="{B590C078-9131-4E49-8A0D-400FEE8377B5}" type="datetimeFigureOut">
               <a:rPr lang="en-US" smtClean="0"/>
-              <a:t>12/21/2018</a:t>
+              <a:t>9/19/2019</a:t>
             </a:fld>
             <a:endParaRPr lang="en-US"/>
           </a:p>
@@ -1134,7 +1135,7 @@
   <p:clrMapOvr>
     <a:masterClrMapping/>
   </p:clrMapOvr>
-  <p:extLst mod="1">
+  <p:extLst>
     <p:ext uri="{DCECCB84-F9BA-43D5-87BE-67443E8EF086}">
       <p15:sldGuideLst xmlns:p15="http://schemas.microsoft.com/office/powerpoint/2012/main">
         <p15:guide id="2" pos="384">
@@ -1479,7 +1480,7 @@
   <p:clrMapOvr>
     <a:masterClrMapping/>
   </p:clrMapOvr>
-  <p:extLst mod="1">
+  <p:extLst>
     <p:ext uri="{DCECCB84-F9BA-43D5-87BE-67443E8EF086}">
       <p15:sldGuideLst xmlns:p15="http://schemas.microsoft.com/office/powerpoint/2012/main">
         <p15:guide id="2" pos="384">
@@ -1824,7 +1825,7 @@
   <p:clrMapOvr>
     <a:masterClrMapping/>
   </p:clrMapOvr>
-  <p:extLst mod="1">
+  <p:extLst>
     <p:ext uri="{DCECCB84-F9BA-43D5-87BE-67443E8EF086}">
       <p15:sldGuideLst xmlns:p15="http://schemas.microsoft.com/office/powerpoint/2012/main">
         <p15:guide id="2" pos="384">
@@ -2169,7 +2170,7 @@
   <p:clrMapOvr>
     <a:masterClrMapping/>
   </p:clrMapOvr>
-  <p:extLst mod="1">
+  <p:extLst>
     <p:ext uri="{DCECCB84-F9BA-43D5-87BE-67443E8EF086}">
       <p15:sldGuideLst xmlns:p15="http://schemas.microsoft.com/office/powerpoint/2012/main">
         <p15:guide id="2" pos="384">
@@ -2517,7 +2518,7 @@
   <p:clrMapOvr>
     <a:masterClrMapping/>
   </p:clrMapOvr>
-  <p:extLst mod="1">
+  <p:extLst>
     <p:ext uri="{DCECCB84-F9BA-43D5-87BE-67443E8EF086}">
       <p15:sldGuideLst xmlns:p15="http://schemas.microsoft.com/office/powerpoint/2012/main">
         <p15:guide id="2" pos="384">
@@ -2865,7 +2866,7 @@
   <p:clrMapOvr>
     <a:masterClrMapping/>
   </p:clrMapOvr>
-  <p:extLst mod="1">
+  <p:extLst>
     <p:ext uri="{DCECCB84-F9BA-43D5-87BE-67443E8EF086}">
       <p15:sldGuideLst xmlns:p15="http://schemas.microsoft.com/office/powerpoint/2012/main">
         <p15:guide id="2" pos="384">
@@ -3211,7 +3212,7 @@
   <p:clrMapOvr>
     <a:masterClrMapping/>
   </p:clrMapOvr>
-  <p:extLst mod="1">
+  <p:extLst>
     <p:ext uri="{DCECCB84-F9BA-43D5-87BE-67443E8EF086}">
       <p15:sldGuideLst xmlns:p15="http://schemas.microsoft.com/office/powerpoint/2012/main">
         <p15:guide id="2" pos="384">
@@ -3558,7 +3559,7 @@
   <p:clrMapOvr>
     <a:masterClrMapping/>
   </p:clrMapOvr>
-  <p:extLst mod="1">
+  <p:extLst>
     <p:ext uri="{DCECCB84-F9BA-43D5-87BE-67443E8EF086}">
       <p15:sldGuideLst xmlns:p15="http://schemas.microsoft.com/office/powerpoint/2012/main">
         <p15:guide id="2" pos="384">
@@ -3904,7 +3905,7 @@
   <p:clrMapOvr>
     <a:masterClrMapping/>
   </p:clrMapOvr>
-  <p:extLst mod="1">
+  <p:extLst>
     <p:ext uri="{DCECCB84-F9BA-43D5-87BE-67443E8EF086}">
       <p15:sldGuideLst xmlns:p15="http://schemas.microsoft.com/office/powerpoint/2012/main">
         <p15:guide id="2" pos="384">
@@ -4250,7 +4251,7 @@
   <p:clrMapOvr>
     <a:masterClrMapping/>
   </p:clrMapOvr>
-  <p:extLst mod="1">
+  <p:extLst>
     <p:ext uri="{DCECCB84-F9BA-43D5-87BE-67443E8EF086}">
       <p15:sldGuideLst xmlns:p15="http://schemas.microsoft.com/office/powerpoint/2012/main">
         <p15:guide id="2" pos="384">
@@ -4375,7 +4376,7 @@
           <a:p>
             <a:fld id="{B590C078-9131-4E49-8A0D-400FEE8377B5}" type="datetimeFigureOut">
               <a:rPr lang="en-US" smtClean="0"/>
-              <a:t>12/21/2018</a:t>
+              <a:t>9/19/2019</a:t>
             </a:fld>
             <a:endParaRPr lang="en-US"/>
           </a:p>
@@ -4770,7 +4771,7 @@
   <p:clrMapOvr>
     <a:masterClrMapping/>
   </p:clrMapOvr>
-  <p:extLst mod="1">
+  <p:extLst>
     <p:ext uri="{DCECCB84-F9BA-43D5-87BE-67443E8EF086}">
       <p15:sldGuideLst xmlns:p15="http://schemas.microsoft.com/office/powerpoint/2012/main">
         <p15:guide id="2" pos="384">
@@ -5119,7 +5120,7 @@
   <p:clrMapOvr>
     <a:masterClrMapping/>
   </p:clrMapOvr>
-  <p:extLst mod="1">
+  <p:extLst>
     <p:ext uri="{DCECCB84-F9BA-43D5-87BE-67443E8EF086}">
       <p15:sldGuideLst xmlns:p15="http://schemas.microsoft.com/office/powerpoint/2012/main">
         <p15:guide id="2" pos="384">
@@ -5465,7 +5466,7 @@
   <p:clrMapOvr>
     <a:masterClrMapping/>
   </p:clrMapOvr>
-  <p:extLst mod="1">
+  <p:extLst>
     <p:ext uri="{DCECCB84-F9BA-43D5-87BE-67443E8EF086}">
       <p15:sldGuideLst xmlns:p15="http://schemas.microsoft.com/office/powerpoint/2012/main">
         <p15:guide id="2" pos="384">
@@ -5857,7 +5858,7 @@
   <p:clrMapOvr>
     <a:masterClrMapping/>
   </p:clrMapOvr>
-  <p:extLst mod="1">
+  <p:extLst>
     <p:ext uri="{DCECCB84-F9BA-43D5-87BE-67443E8EF086}">
       <p15:sldGuideLst xmlns:p15="http://schemas.microsoft.com/office/powerpoint/2012/main">
         <p15:guide id="2" pos="384">
@@ -6249,7 +6250,7 @@
   <p:clrMapOvr>
     <a:masterClrMapping/>
   </p:clrMapOvr>
-  <p:extLst mod="1">
+  <p:extLst>
     <p:ext uri="{DCECCB84-F9BA-43D5-87BE-67443E8EF086}">
       <p15:sldGuideLst xmlns:p15="http://schemas.microsoft.com/office/powerpoint/2012/main">
         <p15:guide id="2" pos="384">
@@ -6641,7 +6642,7 @@
   <p:clrMapOvr>
     <a:masterClrMapping/>
   </p:clrMapOvr>
-  <p:extLst mod="1">
+  <p:extLst>
     <p:ext uri="{DCECCB84-F9BA-43D5-87BE-67443E8EF086}">
       <p15:sldGuideLst xmlns:p15="http://schemas.microsoft.com/office/powerpoint/2012/main">
         <p15:guide id="2" pos="384">
@@ -7033,7 +7034,7 @@
   <p:clrMapOvr>
     <a:masterClrMapping/>
   </p:clrMapOvr>
-  <p:extLst mod="1">
+  <p:extLst>
     <p:ext uri="{DCECCB84-F9BA-43D5-87BE-67443E8EF086}">
       <p15:sldGuideLst xmlns:p15="http://schemas.microsoft.com/office/powerpoint/2012/main">
         <p15:guide id="2" pos="384">
@@ -7425,7 +7426,7 @@
   <p:clrMapOvr>
     <a:masterClrMapping/>
   </p:clrMapOvr>
-  <p:extLst mod="1">
+  <p:extLst>
     <p:ext uri="{DCECCB84-F9BA-43D5-87BE-67443E8EF086}">
       <p15:sldGuideLst xmlns:p15="http://schemas.microsoft.com/office/powerpoint/2012/main">
         <p15:guide id="2" pos="384">
@@ -7811,7 +7812,7 @@
   <p:clrMapOvr>
     <a:masterClrMapping/>
   </p:clrMapOvr>
-  <p:extLst mod="1">
+  <p:extLst>
     <p:ext uri="{DCECCB84-F9BA-43D5-87BE-67443E8EF086}">
       <p15:sldGuideLst xmlns:p15="http://schemas.microsoft.com/office/powerpoint/2012/main">
         <p15:guide id="2" pos="384">
@@ -8197,7 +8198,7 @@
   <p:clrMapOvr>
     <a:masterClrMapping/>
   </p:clrMapOvr>
-  <p:extLst mod="1">
+  <p:extLst>
     <p:ext uri="{DCECCB84-F9BA-43D5-87BE-67443E8EF086}">
       <p15:sldGuideLst xmlns:p15="http://schemas.microsoft.com/office/powerpoint/2012/main">
         <p15:guide id="2" pos="384">
@@ -8453,7 +8454,7 @@
           <a:p>
             <a:fld id="{B590C078-9131-4E49-8A0D-400FEE8377B5}" type="datetimeFigureOut">
               <a:rPr lang="en-US" smtClean="0"/>
-              <a:t>12/21/2018</a:t>
+              <a:t>9/19/2019</a:t>
             </a:fld>
             <a:endParaRPr lang="en-US"/>
           </a:p>
@@ -10328,7 +10329,7 @@
   <p:clrMapOvr>
     <a:masterClrMapping/>
   </p:clrMapOvr>
-  <p:extLst mod="1">
+  <p:extLst>
     <p:ext uri="{DCECCB84-F9BA-43D5-87BE-67443E8EF086}">
       <p15:sldGuideLst xmlns:p15="http://schemas.microsoft.com/office/powerpoint/2012/main">
         <p15:guide id="1" pos="3840">
@@ -10754,7 +10755,7 @@
   <p:clrMapOvr>
     <a:masterClrMapping/>
   </p:clrMapOvr>
-  <p:extLst mod="1">
+  <p:extLst>
     <p:ext uri="{DCECCB84-F9BA-43D5-87BE-67443E8EF086}">
       <p15:sldGuideLst xmlns:p15="http://schemas.microsoft.com/office/powerpoint/2012/main">
         <p15:guide id="1" pos="3840">
@@ -11177,7 +11178,7 @@
   <p:clrMapOvr>
     <a:masterClrMapping/>
   </p:clrMapOvr>
-  <p:extLst mod="1">
+  <p:extLst>
     <p:ext uri="{DCECCB84-F9BA-43D5-87BE-67443E8EF086}">
       <p15:sldGuideLst xmlns:p15="http://schemas.microsoft.com/office/powerpoint/2012/main">
         <p15:guide id="1" pos="3840">
@@ -11598,7 +11599,7 @@
   <p:clrMapOvr>
     <a:masterClrMapping/>
   </p:clrMapOvr>
-  <p:extLst mod="1">
+  <p:extLst>
     <p:ext uri="{DCECCB84-F9BA-43D5-87BE-67443E8EF086}">
       <p15:sldGuideLst xmlns:p15="http://schemas.microsoft.com/office/powerpoint/2012/main">
         <p15:guide id="1" pos="3840">
@@ -11779,7 +11780,7 @@
   <p:clrMapOvr>
     <a:masterClrMapping/>
   </p:clrMapOvr>
-  <p:extLst mod="1">
+  <p:extLst>
     <p:ext uri="{DCECCB84-F9BA-43D5-87BE-67443E8EF086}">
       <p15:sldGuideLst xmlns:p15="http://schemas.microsoft.com/office/powerpoint/2012/main">
         <p15:guide id="1" pos="3840" userDrawn="1">
@@ -12124,7 +12125,7 @@
   <p:clrMapOvr>
     <a:masterClrMapping/>
   </p:clrMapOvr>
-  <p:extLst mod="1">
+  <p:extLst>
     <p:ext uri="{DCECCB84-F9BA-43D5-87BE-67443E8EF086}">
       <p15:sldGuideLst xmlns:p15="http://schemas.microsoft.com/office/powerpoint/2012/main">
         <p15:guide id="2" pos="384">
@@ -12278,7 +12279,7 @@
           <a:p>
             <a:fld id="{B590C078-9131-4E49-8A0D-400FEE8377B5}" type="datetimeFigureOut">
               <a:rPr lang="en-US" smtClean="0"/>
-              <a:t>12/21/2018</a:t>
+              <a:t>9/19/2019</a:t>
             </a:fld>
             <a:endParaRPr lang="en-US"/>
           </a:p>
@@ -12740,7 +12741,7 @@
       </a:lvl9pPr>
     </p:otherStyle>
   </p:txStyles>
-  <p:extLst mod="1">
+  <p:extLst>
     <p:ext uri="{27BBF7A9-308A-43DC-89C8-2F10F3537804}">
       <p15:sldGuideLst xmlns:p15="http://schemas.microsoft.com/office/powerpoint/2012/main">
         <p15:guide id="1" pos="3840" userDrawn="1">
@@ -12810,7 +12811,7 @@
         </p:nvSpPr>
         <p:spPr>
           <a:xfrm>
-            <a:off x="642730" y="1333500"/>
+            <a:off x="293709" y="1333500"/>
             <a:ext cx="10939670" cy="5181600"/>
           </a:xfrm>
         </p:spPr>
@@ -12892,6 +12893,16 @@
                 </a:solidFill>
               </a:rPr>
               <a:t>TECHNOLOGIES</a:t>
+            </a:r>
+          </a:p>
+          <a:p>
+            <a:r>
+              <a:rPr lang="fr-FR" dirty="0">
+                <a:solidFill>
+                  <a:srgbClr val="00B050"/>
+                </a:solidFill>
+              </a:rPr>
+              <a:t>CUSTOM_EXPRESSIONS</a:t>
             </a:r>
           </a:p>
           <a:p>
@@ -14182,6 +14193,62 @@
             <a:r>
               <a:rPr lang="en-US" sz="1200" dirty="0"/>
               <a:t>EACH</a:t>
+            </a:r>
+            <a:endParaRPr lang="en-US" dirty="0"/>
+          </a:p>
+        </p:txBody>
+      </p:sp>
+      <p:sp>
+        <p:nvSpPr>
+          <p:cNvPr id="37" name="Rectangle: Rounded Corners 36">
+            <a:extLst>
+              <a:ext uri="{FF2B5EF4-FFF2-40B4-BE49-F238E27FC236}">
+                <a16:creationId xmlns:a16="http://schemas.microsoft.com/office/drawing/2014/main" id="{026020E4-DAB5-4FC6-9C42-AC3C825E12F2}"/>
+              </a:ext>
+            </a:extLst>
+          </p:cNvPr>
+          <p:cNvSpPr/>
+          <p:nvPr/>
+        </p:nvSpPr>
+        <p:spPr>
+          <a:xfrm>
+            <a:off x="3706129" y="4788784"/>
+            <a:ext cx="1580670" cy="322080"/>
+          </a:xfrm>
+          <a:prstGeom prst="roundRect">
+            <a:avLst/>
+          </a:prstGeom>
+          <a:solidFill>
+            <a:srgbClr val="00B050"/>
+          </a:solidFill>
+          <a:ln>
+            <a:noFill/>
+          </a:ln>
+        </p:spPr>
+        <p:style>
+          <a:lnRef idx="2">
+            <a:schemeClr val="accent1">
+              <a:shade val="50000"/>
+            </a:schemeClr>
+          </a:lnRef>
+          <a:fillRef idx="1">
+            <a:schemeClr val="accent1"/>
+          </a:fillRef>
+          <a:effectRef idx="0">
+            <a:schemeClr val="accent1"/>
+          </a:effectRef>
+          <a:fontRef idx="minor">
+            <a:schemeClr val="lt1"/>
+          </a:fontRef>
+        </p:style>
+        <p:txBody>
+          <a:bodyPr rtlCol="0" anchor="ctr"/>
+          <a:lstStyle/>
+          <a:p>
+            <a:pPr algn="ctr"/>
+            <a:r>
+              <a:rPr lang="en-US" sz="1200" dirty="0"/>
+              <a:t>&lt;EXPRESSIONS&gt;</a:t>
             </a:r>
             <a:endParaRPr lang="en-US" dirty="0"/>
           </a:p>
@@ -14234,6 +14301,554 @@
           <a:p>
             <a:r>
               <a:rPr lang="en-US" dirty="0"/>
+              <a:t>SAMPLE 8</a:t>
+            </a:r>
+          </a:p>
+        </p:txBody>
+      </p:sp>
+      <p:sp>
+        <p:nvSpPr>
+          <p:cNvPr id="3" name="Text Placeholder 2"/>
+          <p:cNvSpPr>
+            <a:spLocks noGrp="1"/>
+          </p:cNvSpPr>
+          <p:nvPr>
+            <p:ph type="body" sz="quarter" idx="13"/>
+          </p:nvPr>
+        </p:nvSpPr>
+        <p:spPr/>
+        <p:txBody>
+          <a:bodyPr/>
+          <a:lstStyle/>
+          <a:p>
+            <a:r>
+              <a:rPr lang="en-GB" dirty="0"/>
+              <a:t>Table to get specific custom expressions by application</a:t>
+            </a:r>
+            <a:endParaRPr lang="en-US" dirty="0"/>
+          </a:p>
+          <a:p>
+            <a:r>
+              <a:rPr lang="en-US" sz="1400" dirty="0"/>
+              <a:t>TABLE;PF_GENERIC_TABLE;COL1=CUSTOM_EXPRESSIONS,ROW1=APPLICATIONS,APPLICATIONS=EACH,CUSTOM_EXPRESSIONS=a/b|(</a:t>
+            </a:r>
+            <a:r>
+              <a:rPr lang="en-US" sz="1400" dirty="0" err="1"/>
+              <a:t>c+d</a:t>
+            </a:r>
+            <a:r>
+              <a:rPr lang="en-US" sz="1400" dirty="0"/>
+              <a:t>)/2,PARAMS=SZ a SZ b QR c QR </a:t>
+            </a:r>
+            <a:r>
+              <a:rPr lang="en-US" sz="1400" dirty="0" err="1"/>
+              <a:t>d,a</a:t>
+            </a:r>
+            <a:r>
+              <a:rPr lang="en-US" sz="1400" dirty="0"/>
+              <a:t>=67211,b=10151,c=60012,d=60013</a:t>
+            </a:r>
+          </a:p>
+          <a:p>
+            <a:endParaRPr lang="en-US" sz="1400" dirty="0"/>
+          </a:p>
+          <a:p>
+            <a:pPr marL="0" indent="0">
+              <a:buNone/>
+            </a:pPr>
+            <a:endParaRPr lang="en-US" sz="1400" dirty="0"/>
+          </a:p>
+        </p:txBody>
+      </p:sp>
+      <p:pic>
+        <p:nvPicPr>
+          <p:cNvPr id="4" name="Picture 3"/>
+          <p:cNvPicPr>
+            <a:picLocks noChangeAspect="1"/>
+          </p:cNvPicPr>
+          <p:nvPr/>
+        </p:nvPicPr>
+        <p:blipFill>
+          <a:blip r:embed="rId2">
+            <a:extLst>
+              <a:ext uri="{28A0092B-C50C-407E-A947-70E740481C1C}">
+                <a14:useLocalDpi xmlns:a14="http://schemas.microsoft.com/office/drawing/2010/main" val="0"/>
+              </a:ext>
+            </a:extLst>
+          </a:blip>
+          <a:stretch>
+            <a:fillRect/>
+          </a:stretch>
+        </p:blipFill>
+        <p:spPr>
+          <a:xfrm>
+            <a:off x="258603" y="127459"/>
+            <a:ext cx="655797" cy="657255"/>
+          </a:xfrm>
+          <a:prstGeom prst="rect">
+            <a:avLst/>
+          </a:prstGeom>
+        </p:spPr>
+      </p:pic>
+      <p:graphicFrame>
+        <p:nvGraphicFramePr>
+          <p:cNvPr id="8" name="Table 7" descr="TABLE;PF_GENERIC_TABLE;COL1=CUSTOM_EXPRESSIONS,ROW1=APPLICATIONS,APPLICATIONS=EACH,CUSTOM_EXPRESSIONS=a/b|(c+d)/2,PARAMS=SZ a SZ b QR c QR d,a=67211,b=10151,c=60012,d=60013"/>
+          <p:cNvGraphicFramePr>
+            <a:graphicFrameLocks noGrp="1"/>
+          </p:cNvGraphicFramePr>
+          <p:nvPr>
+            <p:extLst>
+              <p:ext uri="{D42A27DB-BD31-4B8C-83A1-F6EECF244321}">
+                <p14:modId xmlns:p14="http://schemas.microsoft.com/office/powerpoint/2010/main" val="2097834386"/>
+              </p:ext>
+            </p:extLst>
+          </p:nvPr>
+        </p:nvGraphicFramePr>
+        <p:xfrm>
+          <a:off x="2004364" y="3229280"/>
+          <a:ext cx="6615237" cy="2225040"/>
+        </p:xfrm>
+        <a:graphic>
+          <a:graphicData uri="http://schemas.openxmlformats.org/drawingml/2006/table">
+            <a:tbl>
+              <a:tblPr firstRow="1" bandRow="1">
+                <a:tableStyleId>{00A15C55-8517-42AA-B614-E9B94910E393}</a:tableStyleId>
+              </a:tblPr>
+              <a:tblGrid>
+                <a:gridCol w="2273989">
+                  <a:extLst>
+                    <a:ext uri="{9D8B030D-6E8A-4147-A177-3AD203B41FA5}">
+                      <a16:colId xmlns:a16="http://schemas.microsoft.com/office/drawing/2014/main" val="2686098126"/>
+                    </a:ext>
+                  </a:extLst>
+                </a:gridCol>
+                <a:gridCol w="2170624">
+                  <a:extLst>
+                    <a:ext uri="{9D8B030D-6E8A-4147-A177-3AD203B41FA5}">
+                      <a16:colId xmlns:a16="http://schemas.microsoft.com/office/drawing/2014/main" val="4068201546"/>
+                    </a:ext>
+                  </a:extLst>
+                </a:gridCol>
+                <a:gridCol w="2170624">
+                  <a:extLst>
+                    <a:ext uri="{9D8B030D-6E8A-4147-A177-3AD203B41FA5}">
+                      <a16:colId xmlns:a16="http://schemas.microsoft.com/office/drawing/2014/main" val="3791839889"/>
+                    </a:ext>
+                  </a:extLst>
+                </a:gridCol>
+              </a:tblGrid>
+              <a:tr h="370840">
+                <a:tc>
+                  <a:txBody>
+                    <a:bodyPr/>
+                    <a:lstStyle/>
+                    <a:p>
+                      <a:r>
+                        <a:rPr lang="en-US" sz="1200" dirty="0"/>
+                        <a:t>Applications</a:t>
+                      </a:r>
+                    </a:p>
+                  </a:txBody>
+                  <a:tcPr anchor="ctr"/>
+                </a:tc>
+                <a:tc>
+                  <a:txBody>
+                    <a:bodyPr/>
+                    <a:lstStyle/>
+                    <a:p>
+                      <a:pPr algn="ctr"/>
+                      <a:r>
+                        <a:rPr lang="en-US" sz="1200" dirty="0"/>
+                        <a:t>a/b</a:t>
+                      </a:r>
+                    </a:p>
+                  </a:txBody>
+                  <a:tcPr anchor="ctr"/>
+                </a:tc>
+                <a:tc>
+                  <a:txBody>
+                    <a:bodyPr/>
+                    <a:lstStyle/>
+                    <a:p>
+                      <a:pPr algn="ctr"/>
+                      <a:r>
+                        <a:rPr lang="en-US" sz="1200" dirty="0"/>
+                        <a:t>(</a:t>
+                      </a:r>
+                      <a:r>
+                        <a:rPr lang="en-US" sz="1200" dirty="0" err="1"/>
+                        <a:t>c+d</a:t>
+                      </a:r>
+                      <a:r>
+                        <a:rPr lang="en-US" sz="1200" dirty="0"/>
+                        <a:t>)/2</a:t>
+                      </a:r>
+                    </a:p>
+                  </a:txBody>
+                  <a:tcPr anchor="ctr"/>
+                </a:tc>
+                <a:extLst>
+                  <a:ext uri="{0D108BD9-81ED-4DB2-BD59-A6C34878D82A}">
+                    <a16:rowId xmlns:a16="http://schemas.microsoft.com/office/drawing/2014/main" val="1266671279"/>
+                  </a:ext>
+                </a:extLst>
+              </a:tr>
+              <a:tr h="370840">
+                <a:tc>
+                  <a:txBody>
+                    <a:bodyPr/>
+                    <a:lstStyle/>
+                    <a:p>
+                      <a:r>
+                        <a:rPr lang="en-US" sz="1200" dirty="0"/>
+                        <a:t>Application 1</a:t>
+                      </a:r>
+                    </a:p>
+                  </a:txBody>
+                  <a:tcPr anchor="ctr"/>
+                </a:tc>
+                <a:tc>
+                  <a:txBody>
+                    <a:bodyPr/>
+                    <a:lstStyle/>
+                    <a:p>
+                      <a:pPr algn="ctr"/>
+                      <a:r>
+                        <a:rPr lang="en-US" sz="1200" dirty="0"/>
+                        <a:t>number</a:t>
+                      </a:r>
+                    </a:p>
+                  </a:txBody>
+                  <a:tcPr anchor="ctr"/>
+                </a:tc>
+                <a:tc>
+                  <a:txBody>
+                    <a:bodyPr/>
+                    <a:lstStyle/>
+                    <a:p>
+                      <a:pPr algn="ctr"/>
+                      <a:r>
+                        <a:rPr lang="en-US" sz="1200" dirty="0"/>
+                        <a:t>number</a:t>
+                      </a:r>
+                    </a:p>
+                  </a:txBody>
+                  <a:tcPr anchor="ctr"/>
+                </a:tc>
+                <a:extLst>
+                  <a:ext uri="{0D108BD9-81ED-4DB2-BD59-A6C34878D82A}">
+                    <a16:rowId xmlns:a16="http://schemas.microsoft.com/office/drawing/2014/main" val="651313564"/>
+                  </a:ext>
+                </a:extLst>
+              </a:tr>
+              <a:tr h="370840">
+                <a:tc>
+                  <a:txBody>
+                    <a:bodyPr/>
+                    <a:lstStyle/>
+                    <a:p>
+                      <a:r>
+                        <a:rPr lang="en-US" sz="1200" dirty="0"/>
+                        <a:t>Application 2</a:t>
+                      </a:r>
+                    </a:p>
+                  </a:txBody>
+                  <a:tcPr anchor="ctr"/>
+                </a:tc>
+                <a:tc>
+                  <a:txBody>
+                    <a:bodyPr/>
+                    <a:lstStyle/>
+                    <a:p>
+                      <a:pPr algn="ctr"/>
+                      <a:r>
+                        <a:rPr lang="en-US" sz="1200" dirty="0"/>
+                        <a:t>number</a:t>
+                      </a:r>
+                    </a:p>
+                  </a:txBody>
+                  <a:tcPr anchor="ctr"/>
+                </a:tc>
+                <a:tc>
+                  <a:txBody>
+                    <a:bodyPr/>
+                    <a:lstStyle/>
+                    <a:p>
+                      <a:pPr algn="ctr"/>
+                      <a:r>
+                        <a:rPr lang="en-US" sz="1200" dirty="0"/>
+                        <a:t>number</a:t>
+                      </a:r>
+                    </a:p>
+                  </a:txBody>
+                  <a:tcPr anchor="ctr"/>
+                </a:tc>
+                <a:extLst>
+                  <a:ext uri="{0D108BD9-81ED-4DB2-BD59-A6C34878D82A}">
+                    <a16:rowId xmlns:a16="http://schemas.microsoft.com/office/drawing/2014/main" val="258950862"/>
+                  </a:ext>
+                </a:extLst>
+              </a:tr>
+              <a:tr h="370840">
+                <a:tc>
+                  <a:txBody>
+                    <a:bodyPr/>
+                    <a:lstStyle/>
+                    <a:p>
+                      <a:r>
+                        <a:rPr lang="en-US" sz="1200" dirty="0"/>
+                        <a:t>Application 3</a:t>
+                      </a:r>
+                    </a:p>
+                  </a:txBody>
+                  <a:tcPr anchor="ctr"/>
+                </a:tc>
+                <a:tc>
+                  <a:txBody>
+                    <a:bodyPr/>
+                    <a:lstStyle/>
+                    <a:p>
+                      <a:pPr algn="ctr"/>
+                      <a:r>
+                        <a:rPr lang="en-US" sz="1200" dirty="0"/>
+                        <a:t>number</a:t>
+                      </a:r>
+                    </a:p>
+                  </a:txBody>
+                  <a:tcPr anchor="ctr"/>
+                </a:tc>
+                <a:tc>
+                  <a:txBody>
+                    <a:bodyPr/>
+                    <a:lstStyle/>
+                    <a:p>
+                      <a:pPr algn="ctr"/>
+                      <a:r>
+                        <a:rPr lang="en-US" sz="1200" dirty="0"/>
+                        <a:t>number</a:t>
+                      </a:r>
+                    </a:p>
+                  </a:txBody>
+                  <a:tcPr anchor="ctr"/>
+                </a:tc>
+                <a:extLst>
+                  <a:ext uri="{0D108BD9-81ED-4DB2-BD59-A6C34878D82A}">
+                    <a16:rowId xmlns:a16="http://schemas.microsoft.com/office/drawing/2014/main" val="396502939"/>
+                  </a:ext>
+                </a:extLst>
+              </a:tr>
+              <a:tr h="370840">
+                <a:tc>
+                  <a:txBody>
+                    <a:bodyPr/>
+                    <a:lstStyle/>
+                    <a:p>
+                      <a:r>
+                        <a:rPr lang="en-US" sz="1200" dirty="0"/>
+                        <a:t>Application 4</a:t>
+                      </a:r>
+                    </a:p>
+                  </a:txBody>
+                  <a:tcPr anchor="ctr"/>
+                </a:tc>
+                <a:tc>
+                  <a:txBody>
+                    <a:bodyPr/>
+                    <a:lstStyle/>
+                    <a:p>
+                      <a:pPr algn="ctr"/>
+                      <a:r>
+                        <a:rPr lang="en-US" sz="1200" dirty="0"/>
+                        <a:t>number</a:t>
+                      </a:r>
+                    </a:p>
+                  </a:txBody>
+                  <a:tcPr anchor="ctr"/>
+                </a:tc>
+                <a:tc>
+                  <a:txBody>
+                    <a:bodyPr/>
+                    <a:lstStyle/>
+                    <a:p>
+                      <a:pPr algn="ctr"/>
+                      <a:r>
+                        <a:rPr lang="en-US" sz="1200" dirty="0"/>
+                        <a:t>number</a:t>
+                      </a:r>
+                    </a:p>
+                  </a:txBody>
+                  <a:tcPr anchor="ctr"/>
+                </a:tc>
+                <a:extLst>
+                  <a:ext uri="{0D108BD9-81ED-4DB2-BD59-A6C34878D82A}">
+                    <a16:rowId xmlns:a16="http://schemas.microsoft.com/office/drawing/2014/main" val="798638133"/>
+                  </a:ext>
+                </a:extLst>
+              </a:tr>
+              <a:tr h="370840">
+                <a:tc>
+                  <a:txBody>
+                    <a:bodyPr/>
+                    <a:lstStyle/>
+                    <a:p>
+                      <a:r>
+                        <a:rPr lang="en-US" sz="1200" dirty="0"/>
+                        <a:t>…</a:t>
+                      </a:r>
+                    </a:p>
+                  </a:txBody>
+                  <a:tcPr anchor="ctr"/>
+                </a:tc>
+                <a:tc>
+                  <a:txBody>
+                    <a:bodyPr/>
+                    <a:lstStyle/>
+                    <a:p>
+                      <a:pPr algn="ctr"/>
+                      <a:r>
+                        <a:rPr lang="en-US" sz="1200" dirty="0"/>
+                        <a:t>Number</a:t>
+                      </a:r>
+                    </a:p>
+                  </a:txBody>
+                  <a:tcPr anchor="ctr"/>
+                </a:tc>
+                <a:tc>
+                  <a:txBody>
+                    <a:bodyPr/>
+                    <a:lstStyle/>
+                    <a:p>
+                      <a:pPr algn="ctr"/>
+                      <a:r>
+                        <a:rPr lang="en-US" sz="1200" dirty="0"/>
+                        <a:t>number</a:t>
+                      </a:r>
+                    </a:p>
+                  </a:txBody>
+                  <a:tcPr anchor="ctr"/>
+                </a:tc>
+                <a:extLst>
+                  <a:ext uri="{0D108BD9-81ED-4DB2-BD59-A6C34878D82A}">
+                    <a16:rowId xmlns:a16="http://schemas.microsoft.com/office/drawing/2014/main" val="1160819079"/>
+                  </a:ext>
+                </a:extLst>
+              </a:tr>
+            </a:tbl>
+          </a:graphicData>
+        </a:graphic>
+      </p:graphicFrame>
+      <p:sp>
+        <p:nvSpPr>
+          <p:cNvPr id="5" name="TextBox 4">
+            <a:extLst>
+              <a:ext uri="{FF2B5EF4-FFF2-40B4-BE49-F238E27FC236}">
+                <a16:creationId xmlns:a16="http://schemas.microsoft.com/office/drawing/2014/main" id="{CBA94EDE-8EA9-4E5C-9E60-BBE713C4FEA6}"/>
+              </a:ext>
+            </a:extLst>
+          </p:cNvPr>
+          <p:cNvSpPr txBox="1"/>
+          <p:nvPr/>
+        </p:nvSpPr>
+        <p:spPr>
+          <a:xfrm>
+            <a:off x="3408218" y="2286000"/>
+            <a:ext cx="3020291" cy="250441"/>
+          </a:xfrm>
+          <a:prstGeom prst="rect">
+            <a:avLst/>
+          </a:prstGeom>
+        </p:spPr>
+        <p:txBody>
+          <a:bodyPr vert="horz" wrap="square" lIns="91440" tIns="45720" rIns="91440" bIns="45720" rtlCol="0" anchor="t">
+            <a:noAutofit/>
+          </a:bodyPr>
+          <a:lstStyle/>
+          <a:p>
+            <a:endParaRPr lang="en-US" dirty="0"/>
+          </a:p>
+        </p:txBody>
+      </p:sp>
+      <p:sp>
+        <p:nvSpPr>
+          <p:cNvPr id="6" name="TextBox 5">
+            <a:extLst>
+              <a:ext uri="{FF2B5EF4-FFF2-40B4-BE49-F238E27FC236}">
+                <a16:creationId xmlns:a16="http://schemas.microsoft.com/office/drawing/2014/main" id="{E06462D6-C8A1-471A-A147-74131A2CB652}"/>
+              </a:ext>
+            </a:extLst>
+          </p:cNvPr>
+          <p:cNvSpPr txBox="1"/>
+          <p:nvPr/>
+        </p:nvSpPr>
+        <p:spPr>
+          <a:xfrm>
+            <a:off x="1767780" y="2895601"/>
+            <a:ext cx="7362365" cy="360219"/>
+          </a:xfrm>
+          <a:prstGeom prst="rect">
+            <a:avLst/>
+          </a:prstGeom>
+        </p:spPr>
+        <p:txBody>
+          <a:bodyPr vert="horz" wrap="square" lIns="91440" tIns="45720" rIns="91440" bIns="45720" rtlCol="0" anchor="t">
+            <a:noAutofit/>
+          </a:bodyPr>
+          <a:lstStyle/>
+          <a:p>
+            <a:r>
+              <a:rPr lang="en-US" sz="1400" dirty="0"/>
+              <a:t>Custom expressions by application</a:t>
+            </a:r>
+          </a:p>
+        </p:txBody>
+      </p:sp>
+    </p:spTree>
+    <p:extLst>
+      <p:ext uri="{BB962C8B-B14F-4D97-AF65-F5344CB8AC3E}">
+        <p14:creationId xmlns:p14="http://schemas.microsoft.com/office/powerpoint/2010/main" val="3838285136"/>
+      </p:ext>
+    </p:extLst>
+  </p:cSld>
+  <p:clrMapOvr>
+    <a:masterClrMapping/>
+  </p:clrMapOvr>
+</p:sld>
+</file>
+
+<file path=ppt/slides/slide11.xml><?xml version="1.0" encoding="utf-8"?>
+<p:sld xmlns:a="http://schemas.openxmlformats.org/drawingml/2006/main" xmlns:r="http://schemas.openxmlformats.org/officeDocument/2006/relationships" xmlns:p="http://schemas.openxmlformats.org/presentationml/2006/main">
+  <p:cSld>
+    <p:spTree>
+      <p:nvGrpSpPr>
+        <p:cNvPr id="1" name=""/>
+        <p:cNvGrpSpPr/>
+        <p:nvPr/>
+      </p:nvGrpSpPr>
+      <p:grpSpPr>
+        <a:xfrm>
+          <a:off x="0" y="0"/>
+          <a:ext cx="0" cy="0"/>
+          <a:chOff x="0" y="0"/>
+          <a:chExt cx="0" cy="0"/>
+        </a:xfrm>
+      </p:grpSpPr>
+      <p:sp>
+        <p:nvSpPr>
+          <p:cNvPr id="2" name="Title 1"/>
+          <p:cNvSpPr>
+            <a:spLocks noGrp="1"/>
+          </p:cNvSpPr>
+          <p:nvPr>
+            <p:ph type="title"/>
+          </p:nvPr>
+        </p:nvSpPr>
+        <p:spPr/>
+        <p:txBody>
+          <a:bodyPr/>
+          <a:lstStyle/>
+          <a:p>
+            <a:r>
+              <a:rPr lang="en-US" dirty="0"/>
               <a:t>Notes</a:t>
             </a:r>
           </a:p>
@@ -14400,13 +15015,13 @@
         </p:nvSpPr>
         <p:spPr>
           <a:xfrm>
-            <a:off x="642730" y="1333500"/>
-            <a:ext cx="10939670" cy="2480469"/>
+            <a:off x="642730" y="1079582"/>
+            <a:ext cx="10939670" cy="2734387"/>
           </a:xfrm>
         </p:spPr>
         <p:txBody>
           <a:bodyPr>
-            <a:normAutofit fontScale="62500" lnSpcReduction="20000"/>
+            <a:normAutofit fontScale="55000" lnSpcReduction="20000"/>
           </a:bodyPr>
           <a:lstStyle/>
           <a:p>
@@ -14690,6 +15305,13 @@
               <a:rPr lang="en-US" dirty="0"/>
               <a:t>and “a”, “b”, “c”, “d” and “e” are values from selected axis.</a:t>
             </a:r>
+          </a:p>
+          <a:p>
+            <a:r>
+              <a:rPr lang="en-GB" dirty="0"/>
+              <a:t>For Custom expressions axis, the CUSTOM_EXPRESSIONS parameter can contains a list of custom expressions separated by ‘|’, and supplementary options are needed : PARAMS (mandatory) contains the list of parameters of the custom expression, FORMAT (optional) contains the format of the result, and of course, the parameters definition (see sample 8).</a:t>
+            </a:r>
+            <a:endParaRPr lang="en-US" dirty="0"/>
           </a:p>
           <a:p>
             <a:r>

</xml_diff>